<commit_message>
Updates to results tables and figs, and worked on Discussion
</commit_message>
<xml_diff>
--- a/DEBkiss results/Results fig for ch4.pptx
+++ b/DEBkiss results/Results fig for ch4.pptx
@@ -243,7 +243,7 @@
           <a:p>
             <a:fld id="{95000D9E-F495-496A-ABE1-65092D83B55F}" type="datetimeFigureOut">
               <a:rPr lang="en-US" smtClean="0"/>
-              <a:t>3/21/2023</a:t>
+              <a:t>3/24/2023</a:t>
             </a:fld>
             <a:endParaRPr lang="en-US"/>
           </a:p>
@@ -413,7 +413,7 @@
           <a:p>
             <a:fld id="{95000D9E-F495-496A-ABE1-65092D83B55F}" type="datetimeFigureOut">
               <a:rPr lang="en-US" smtClean="0"/>
-              <a:t>3/21/2023</a:t>
+              <a:t>3/24/2023</a:t>
             </a:fld>
             <a:endParaRPr lang="en-US"/>
           </a:p>
@@ -593,7 +593,7 @@
           <a:p>
             <a:fld id="{95000D9E-F495-496A-ABE1-65092D83B55F}" type="datetimeFigureOut">
               <a:rPr lang="en-US" smtClean="0"/>
-              <a:t>3/21/2023</a:t>
+              <a:t>3/24/2023</a:t>
             </a:fld>
             <a:endParaRPr lang="en-US"/>
           </a:p>
@@ -763,7 +763,7 @@
           <a:p>
             <a:fld id="{95000D9E-F495-496A-ABE1-65092D83B55F}" type="datetimeFigureOut">
               <a:rPr lang="en-US" smtClean="0"/>
-              <a:t>3/21/2023</a:t>
+              <a:t>3/24/2023</a:t>
             </a:fld>
             <a:endParaRPr lang="en-US"/>
           </a:p>
@@ -1007,7 +1007,7 @@
           <a:p>
             <a:fld id="{95000D9E-F495-496A-ABE1-65092D83B55F}" type="datetimeFigureOut">
               <a:rPr lang="en-US" smtClean="0"/>
-              <a:t>3/21/2023</a:t>
+              <a:t>3/24/2023</a:t>
             </a:fld>
             <a:endParaRPr lang="en-US"/>
           </a:p>
@@ -1239,7 +1239,7 @@
           <a:p>
             <a:fld id="{95000D9E-F495-496A-ABE1-65092D83B55F}" type="datetimeFigureOut">
               <a:rPr lang="en-US" smtClean="0"/>
-              <a:t>3/21/2023</a:t>
+              <a:t>3/24/2023</a:t>
             </a:fld>
             <a:endParaRPr lang="en-US"/>
           </a:p>
@@ -1606,7 +1606,7 @@
           <a:p>
             <a:fld id="{95000D9E-F495-496A-ABE1-65092D83B55F}" type="datetimeFigureOut">
               <a:rPr lang="en-US" smtClean="0"/>
-              <a:t>3/21/2023</a:t>
+              <a:t>3/24/2023</a:t>
             </a:fld>
             <a:endParaRPr lang="en-US"/>
           </a:p>
@@ -1724,7 +1724,7 @@
           <a:p>
             <a:fld id="{95000D9E-F495-496A-ABE1-65092D83B55F}" type="datetimeFigureOut">
               <a:rPr lang="en-US" smtClean="0"/>
-              <a:t>3/21/2023</a:t>
+              <a:t>3/24/2023</a:t>
             </a:fld>
             <a:endParaRPr lang="en-US"/>
           </a:p>
@@ -1819,7 +1819,7 @@
           <a:p>
             <a:fld id="{95000D9E-F495-496A-ABE1-65092D83B55F}" type="datetimeFigureOut">
               <a:rPr lang="en-US" smtClean="0"/>
-              <a:t>3/21/2023</a:t>
+              <a:t>3/24/2023</a:t>
             </a:fld>
             <a:endParaRPr lang="en-US"/>
           </a:p>
@@ -2096,7 +2096,7 @@
           <a:p>
             <a:fld id="{95000D9E-F495-496A-ABE1-65092D83B55F}" type="datetimeFigureOut">
               <a:rPr lang="en-US" smtClean="0"/>
-              <a:t>3/21/2023</a:t>
+              <a:t>3/24/2023</a:t>
             </a:fld>
             <a:endParaRPr lang="en-US"/>
           </a:p>
@@ -2353,7 +2353,7 @@
           <a:p>
             <a:fld id="{95000D9E-F495-496A-ABE1-65092D83B55F}" type="datetimeFigureOut">
               <a:rPr lang="en-US" smtClean="0"/>
-              <a:t>3/21/2023</a:t>
+              <a:t>3/24/2023</a:t>
             </a:fld>
             <a:endParaRPr lang="en-US"/>
           </a:p>
@@ -2566,7 +2566,7 @@
           <a:p>
             <a:fld id="{95000D9E-F495-496A-ABE1-65092D83B55F}" type="datetimeFigureOut">
               <a:rPr lang="en-US" smtClean="0"/>
-              <a:t>3/21/2023</a:t>
+              <a:t>3/24/2023</a:t>
             </a:fld>
             <a:endParaRPr lang="en-US"/>
           </a:p>
@@ -2973,10 +2973,10 @@
       </p:grpSpPr>
       <p:pic>
         <p:nvPicPr>
-          <p:cNvPr id="13" name="Picture 12" descr="Chart, diagram&#10;&#10;Description automatically generated">
+          <p:cNvPr id="3" name="Picture 2" descr="Chart, line chart&#10;&#10;Description automatically generated">
             <a:extLst>
               <a:ext uri="{FF2B5EF4-FFF2-40B4-BE49-F238E27FC236}">
-                <a16:creationId xmlns:a16="http://schemas.microsoft.com/office/drawing/2014/main" id="{B3FB6A99-2AAD-54B2-1170-C040F955E30E}"/>
+                <a16:creationId xmlns:a16="http://schemas.microsoft.com/office/drawing/2014/main" id="{4D3817C8-639E-28D1-2EB8-B39E6FF5A426}"/>
               </a:ext>
             </a:extLst>
           </p:cNvPr>
@@ -2999,7 +2999,7 @@
         </p:blipFill>
         <p:spPr>
           <a:xfrm>
-            <a:off x="13851569" y="1884276"/>
+            <a:off x="953924" y="1857735"/>
             <a:ext cx="13052496" cy="13052496"/>
           </a:xfrm>
           <a:prstGeom prst="rect">
@@ -3009,10 +3009,10 @@
       </p:pic>
       <p:pic>
         <p:nvPicPr>
-          <p:cNvPr id="15" name="Picture 14" descr="Chart, scatter chart&#10;&#10;Description automatically generated">
+          <p:cNvPr id="7" name="Picture 6" descr="Chart, scatter chart&#10;&#10;Description automatically generated">
             <a:extLst>
               <a:ext uri="{FF2B5EF4-FFF2-40B4-BE49-F238E27FC236}">
-                <a16:creationId xmlns:a16="http://schemas.microsoft.com/office/drawing/2014/main" id="{1FFFC1D1-8220-2ACA-3A94-97237F31AAFF}"/>
+                <a16:creationId xmlns:a16="http://schemas.microsoft.com/office/drawing/2014/main" id="{0805DD95-F0C6-C34C-523F-2C4744B0D5F0}"/>
               </a:ext>
             </a:extLst>
           </p:cNvPr>
@@ -3035,7 +3035,7 @@
         </p:blipFill>
         <p:spPr>
           <a:xfrm>
-            <a:off x="757509" y="15395935"/>
+            <a:off x="953924" y="15336988"/>
             <a:ext cx="13052496" cy="13052496"/>
           </a:xfrm>
           <a:prstGeom prst="rect">
@@ -3045,10 +3045,10 @@
       </p:pic>
       <p:pic>
         <p:nvPicPr>
-          <p:cNvPr id="11" name="Picture 10" descr="Chart, line chart&#10;&#10;Description automatically generated">
+          <p:cNvPr id="5" name="Picture 4" descr="Chart, diagram&#10;&#10;Description automatically generated">
             <a:extLst>
               <a:ext uri="{FF2B5EF4-FFF2-40B4-BE49-F238E27FC236}">
-                <a16:creationId xmlns:a16="http://schemas.microsoft.com/office/drawing/2014/main" id="{31B21ECB-B323-A86D-D04C-28F007A44DC3}"/>
+                <a16:creationId xmlns:a16="http://schemas.microsoft.com/office/drawing/2014/main" id="{B24D5080-997A-B7DD-9EA8-481DED4FF02B}"/>
               </a:ext>
             </a:extLst>
           </p:cNvPr>
@@ -3071,7 +3071,7 @@
         </p:blipFill>
         <p:spPr>
           <a:xfrm>
-            <a:off x="757509" y="1884276"/>
+            <a:off x="14006420" y="1857735"/>
             <a:ext cx="13052496" cy="13052496"/>
           </a:xfrm>
           <a:prstGeom prst="rect">

</xml_diff>

<commit_message>
More updates to Ch4 - AIC stuff and updated results figure with survival means
</commit_message>
<xml_diff>
--- a/DEBkiss results/Results fig for ch4.pptx
+++ b/DEBkiss results/Results fig for ch4.pptx
@@ -6,6 +6,7 @@
   </p:sldMasterIdLst>
   <p:sldIdLst>
     <p:sldId id="256" r:id="rId2"/>
+    <p:sldId id="257" r:id="rId3"/>
   </p:sldIdLst>
   <p:sldSz cx="27432000" cy="29260800"/>
   <p:notesSz cx="6858000" cy="9144000"/>
@@ -243,7 +244,7 @@
           <a:p>
             <a:fld id="{95000D9E-F495-496A-ABE1-65092D83B55F}" type="datetimeFigureOut">
               <a:rPr lang="en-US" smtClean="0"/>
-              <a:t>3/24/2023</a:t>
+              <a:t>3/26/2023</a:t>
             </a:fld>
             <a:endParaRPr lang="en-US"/>
           </a:p>
@@ -413,7 +414,7 @@
           <a:p>
             <a:fld id="{95000D9E-F495-496A-ABE1-65092D83B55F}" type="datetimeFigureOut">
               <a:rPr lang="en-US" smtClean="0"/>
-              <a:t>3/24/2023</a:t>
+              <a:t>3/26/2023</a:t>
             </a:fld>
             <a:endParaRPr lang="en-US"/>
           </a:p>
@@ -593,7 +594,7 @@
           <a:p>
             <a:fld id="{95000D9E-F495-496A-ABE1-65092D83B55F}" type="datetimeFigureOut">
               <a:rPr lang="en-US" smtClean="0"/>
-              <a:t>3/24/2023</a:t>
+              <a:t>3/26/2023</a:t>
             </a:fld>
             <a:endParaRPr lang="en-US"/>
           </a:p>
@@ -763,7 +764,7 @@
           <a:p>
             <a:fld id="{95000D9E-F495-496A-ABE1-65092D83B55F}" type="datetimeFigureOut">
               <a:rPr lang="en-US" smtClean="0"/>
-              <a:t>3/24/2023</a:t>
+              <a:t>3/26/2023</a:t>
             </a:fld>
             <a:endParaRPr lang="en-US"/>
           </a:p>
@@ -1007,7 +1008,7 @@
           <a:p>
             <a:fld id="{95000D9E-F495-496A-ABE1-65092D83B55F}" type="datetimeFigureOut">
               <a:rPr lang="en-US" smtClean="0"/>
-              <a:t>3/24/2023</a:t>
+              <a:t>3/26/2023</a:t>
             </a:fld>
             <a:endParaRPr lang="en-US"/>
           </a:p>
@@ -1239,7 +1240,7 @@
           <a:p>
             <a:fld id="{95000D9E-F495-496A-ABE1-65092D83B55F}" type="datetimeFigureOut">
               <a:rPr lang="en-US" smtClean="0"/>
-              <a:t>3/24/2023</a:t>
+              <a:t>3/26/2023</a:t>
             </a:fld>
             <a:endParaRPr lang="en-US"/>
           </a:p>
@@ -1606,7 +1607,7 @@
           <a:p>
             <a:fld id="{95000D9E-F495-496A-ABE1-65092D83B55F}" type="datetimeFigureOut">
               <a:rPr lang="en-US" smtClean="0"/>
-              <a:t>3/24/2023</a:t>
+              <a:t>3/26/2023</a:t>
             </a:fld>
             <a:endParaRPr lang="en-US"/>
           </a:p>
@@ -1724,7 +1725,7 @@
           <a:p>
             <a:fld id="{95000D9E-F495-496A-ABE1-65092D83B55F}" type="datetimeFigureOut">
               <a:rPr lang="en-US" smtClean="0"/>
-              <a:t>3/24/2023</a:t>
+              <a:t>3/26/2023</a:t>
             </a:fld>
             <a:endParaRPr lang="en-US"/>
           </a:p>
@@ -1819,7 +1820,7 @@
           <a:p>
             <a:fld id="{95000D9E-F495-496A-ABE1-65092D83B55F}" type="datetimeFigureOut">
               <a:rPr lang="en-US" smtClean="0"/>
-              <a:t>3/24/2023</a:t>
+              <a:t>3/26/2023</a:t>
             </a:fld>
             <a:endParaRPr lang="en-US"/>
           </a:p>
@@ -2096,7 +2097,7 @@
           <a:p>
             <a:fld id="{95000D9E-F495-496A-ABE1-65092D83B55F}" type="datetimeFigureOut">
               <a:rPr lang="en-US" smtClean="0"/>
-              <a:t>3/24/2023</a:t>
+              <a:t>3/26/2023</a:t>
             </a:fld>
             <a:endParaRPr lang="en-US"/>
           </a:p>
@@ -2353,7 +2354,7 @@
           <a:p>
             <a:fld id="{95000D9E-F495-496A-ABE1-65092D83B55F}" type="datetimeFigureOut">
               <a:rPr lang="en-US" smtClean="0"/>
-              <a:t>3/24/2023</a:t>
+              <a:t>3/26/2023</a:t>
             </a:fld>
             <a:endParaRPr lang="en-US"/>
           </a:p>
@@ -2566,7 +2567,7 @@
           <a:p>
             <a:fld id="{95000D9E-F495-496A-ABE1-65092D83B55F}" type="datetimeFigureOut">
               <a:rPr lang="en-US" smtClean="0"/>
-              <a:t>3/24/2023</a:t>
+              <a:t>3/26/2023</a:t>
             </a:fld>
             <a:endParaRPr lang="en-US"/>
           </a:p>
@@ -3613,6 +3614,665 @@
 </p:sld>
 </file>
 
+<file path=ppt/slides/slide2.xml><?xml version="1.0" encoding="utf-8"?>
+<p:sld xmlns:a="http://schemas.openxmlformats.org/drawingml/2006/main" xmlns:r="http://schemas.openxmlformats.org/officeDocument/2006/relationships" xmlns:p="http://schemas.openxmlformats.org/presentationml/2006/main">
+  <p:cSld>
+    <p:spTree>
+      <p:nvGrpSpPr>
+        <p:cNvPr id="1" name=""/>
+        <p:cNvGrpSpPr/>
+        <p:nvPr/>
+      </p:nvGrpSpPr>
+      <p:grpSpPr>
+        <a:xfrm>
+          <a:off x="0" y="0"/>
+          <a:ext cx="0" cy="0"/>
+          <a:chOff x="0" y="0"/>
+          <a:chExt cx="0" cy="0"/>
+        </a:xfrm>
+      </p:grpSpPr>
+      <p:pic>
+        <p:nvPicPr>
+          <p:cNvPr id="3" name="Picture 2" descr="Chart, line chart&#10;&#10;Description automatically generated">
+            <a:extLst>
+              <a:ext uri="{FF2B5EF4-FFF2-40B4-BE49-F238E27FC236}">
+                <a16:creationId xmlns:a16="http://schemas.microsoft.com/office/drawing/2014/main" id="{4D3817C8-639E-28D1-2EB8-B39E6FF5A426}"/>
+              </a:ext>
+            </a:extLst>
+          </p:cNvPr>
+          <p:cNvPicPr>
+            <a:picLocks noChangeAspect="1"/>
+          </p:cNvPicPr>
+          <p:nvPr/>
+        </p:nvPicPr>
+        <p:blipFill>
+          <a:blip r:embed="rId2">
+            <a:extLst>
+              <a:ext uri="{28A0092B-C50C-407E-A947-70E740481C1C}">
+                <a14:useLocalDpi xmlns:a14="http://schemas.microsoft.com/office/drawing/2010/main" val="0"/>
+              </a:ext>
+            </a:extLst>
+          </a:blip>
+          <a:stretch>
+            <a:fillRect/>
+          </a:stretch>
+        </p:blipFill>
+        <p:spPr>
+          <a:xfrm>
+            <a:off x="953924" y="1857735"/>
+            <a:ext cx="13052496" cy="13052496"/>
+          </a:xfrm>
+          <a:prstGeom prst="rect">
+            <a:avLst/>
+          </a:prstGeom>
+        </p:spPr>
+      </p:pic>
+      <p:pic>
+        <p:nvPicPr>
+          <p:cNvPr id="5" name="Picture 4" descr="Chart, diagram&#10;&#10;Description automatically generated">
+            <a:extLst>
+              <a:ext uri="{FF2B5EF4-FFF2-40B4-BE49-F238E27FC236}">
+                <a16:creationId xmlns:a16="http://schemas.microsoft.com/office/drawing/2014/main" id="{B24D5080-997A-B7DD-9EA8-481DED4FF02B}"/>
+              </a:ext>
+            </a:extLst>
+          </p:cNvPr>
+          <p:cNvPicPr>
+            <a:picLocks noChangeAspect="1"/>
+          </p:cNvPicPr>
+          <p:nvPr/>
+        </p:nvPicPr>
+        <p:blipFill>
+          <a:blip r:embed="rId3">
+            <a:extLst>
+              <a:ext uri="{28A0092B-C50C-407E-A947-70E740481C1C}">
+                <a14:useLocalDpi xmlns:a14="http://schemas.microsoft.com/office/drawing/2010/main" val="0"/>
+              </a:ext>
+            </a:extLst>
+          </a:blip>
+          <a:stretch>
+            <a:fillRect/>
+          </a:stretch>
+        </p:blipFill>
+        <p:spPr>
+          <a:xfrm>
+            <a:off x="14006420" y="1857735"/>
+            <a:ext cx="13052496" cy="13052496"/>
+          </a:xfrm>
+          <a:prstGeom prst="rect">
+            <a:avLst/>
+          </a:prstGeom>
+        </p:spPr>
+      </p:pic>
+      <p:pic>
+        <p:nvPicPr>
+          <p:cNvPr id="4" name="Picture 3">
+            <a:extLst>
+              <a:ext uri="{FF2B5EF4-FFF2-40B4-BE49-F238E27FC236}">
+                <a16:creationId xmlns:a16="http://schemas.microsoft.com/office/drawing/2014/main" id="{E107AE3B-4A77-16B0-5945-76C670180D91}"/>
+              </a:ext>
+            </a:extLst>
+          </p:cNvPr>
+          <p:cNvPicPr>
+            <a:picLocks noChangeAspect="1"/>
+          </p:cNvPicPr>
+          <p:nvPr/>
+        </p:nvPicPr>
+        <p:blipFill>
+          <a:blip r:embed="rId4">
+            <a:extLst>
+              <a:ext uri="{28A0092B-C50C-407E-A947-70E740481C1C}">
+                <a14:useLocalDpi xmlns:a14="http://schemas.microsoft.com/office/drawing/2010/main" val="0"/>
+              </a:ext>
+            </a:extLst>
+          </a:blip>
+          <a:stretch>
+            <a:fillRect/>
+          </a:stretch>
+        </p:blipFill>
+        <p:spPr>
+          <a:xfrm>
+            <a:off x="953924" y="15336988"/>
+            <a:ext cx="13052496" cy="13052496"/>
+          </a:xfrm>
+          <a:prstGeom prst="rect">
+            <a:avLst/>
+          </a:prstGeom>
+        </p:spPr>
+      </p:pic>
+      <p:sp>
+        <p:nvSpPr>
+          <p:cNvPr id="40" name="TextBox 39">
+            <a:extLst>
+              <a:ext uri="{FF2B5EF4-FFF2-40B4-BE49-F238E27FC236}">
+                <a16:creationId xmlns:a16="http://schemas.microsoft.com/office/drawing/2014/main" id="{9C6A7639-3201-0586-42B1-4A99E3FEF5C5}"/>
+              </a:ext>
+            </a:extLst>
+          </p:cNvPr>
+          <p:cNvSpPr txBox="1"/>
+          <p:nvPr/>
+        </p:nvSpPr>
+        <p:spPr>
+          <a:xfrm>
+            <a:off x="3151620" y="2190620"/>
+            <a:ext cx="1706879" cy="1169551"/>
+          </a:xfrm>
+          <a:prstGeom prst="rect">
+            <a:avLst/>
+          </a:prstGeom>
+          <a:noFill/>
+        </p:spPr>
+        <p:txBody>
+          <a:bodyPr wrap="square" rtlCol="0">
+            <a:spAutoFit/>
+          </a:bodyPr>
+          <a:lstStyle/>
+          <a:p>
+            <a:r>
+              <a:rPr lang="en-US" sz="7000" dirty="0">
+                <a:latin typeface="Arial" panose="020B0604020202020204" pitchFamily="34" charset="0"/>
+                <a:cs typeface="Arial" panose="020B0604020202020204" pitchFamily="34" charset="0"/>
+              </a:rPr>
+              <a:t>A</a:t>
+            </a:r>
+          </a:p>
+        </p:txBody>
+      </p:sp>
+      <p:sp>
+        <p:nvSpPr>
+          <p:cNvPr id="41" name="TextBox 40">
+            <a:extLst>
+              <a:ext uri="{FF2B5EF4-FFF2-40B4-BE49-F238E27FC236}">
+                <a16:creationId xmlns:a16="http://schemas.microsoft.com/office/drawing/2014/main" id="{A1E61D56-4DFB-A63F-21F3-C0EC1FCBCD60}"/>
+              </a:ext>
+            </a:extLst>
+          </p:cNvPr>
+          <p:cNvSpPr txBox="1"/>
+          <p:nvPr/>
+        </p:nvSpPr>
+        <p:spPr>
+          <a:xfrm>
+            <a:off x="16339832" y="2190622"/>
+            <a:ext cx="1706879" cy="1169551"/>
+          </a:xfrm>
+          <a:prstGeom prst="rect">
+            <a:avLst/>
+          </a:prstGeom>
+          <a:noFill/>
+        </p:spPr>
+        <p:txBody>
+          <a:bodyPr wrap="square" rtlCol="0">
+            <a:spAutoFit/>
+          </a:bodyPr>
+          <a:lstStyle/>
+          <a:p>
+            <a:r>
+              <a:rPr lang="en-US" sz="7000" dirty="0">
+                <a:latin typeface="Arial" panose="020B0604020202020204" pitchFamily="34" charset="0"/>
+                <a:cs typeface="Arial" panose="020B0604020202020204" pitchFamily="34" charset="0"/>
+              </a:rPr>
+              <a:t>B</a:t>
+            </a:r>
+          </a:p>
+        </p:txBody>
+      </p:sp>
+      <p:sp>
+        <p:nvSpPr>
+          <p:cNvPr id="42" name="TextBox 41">
+            <a:extLst>
+              <a:ext uri="{FF2B5EF4-FFF2-40B4-BE49-F238E27FC236}">
+                <a16:creationId xmlns:a16="http://schemas.microsoft.com/office/drawing/2014/main" id="{75BF415D-A780-9370-C4B5-79FC08312262}"/>
+              </a:ext>
+            </a:extLst>
+          </p:cNvPr>
+          <p:cNvSpPr txBox="1"/>
+          <p:nvPr/>
+        </p:nvSpPr>
+        <p:spPr>
+          <a:xfrm>
+            <a:off x="3201834" y="15754223"/>
+            <a:ext cx="1706879" cy="1169551"/>
+          </a:xfrm>
+          <a:prstGeom prst="rect">
+            <a:avLst/>
+          </a:prstGeom>
+          <a:noFill/>
+        </p:spPr>
+        <p:txBody>
+          <a:bodyPr wrap="square" rtlCol="0">
+            <a:spAutoFit/>
+          </a:bodyPr>
+          <a:lstStyle/>
+          <a:p>
+            <a:r>
+              <a:rPr lang="en-US" sz="7000" dirty="0">
+                <a:latin typeface="Arial" panose="020B0604020202020204" pitchFamily="34" charset="0"/>
+                <a:cs typeface="Arial" panose="020B0604020202020204" pitchFamily="34" charset="0"/>
+              </a:rPr>
+              <a:t>C</a:t>
+            </a:r>
+          </a:p>
+        </p:txBody>
+      </p:sp>
+      <p:sp>
+        <p:nvSpPr>
+          <p:cNvPr id="51" name="Rectangle 50">
+            <a:extLst>
+              <a:ext uri="{FF2B5EF4-FFF2-40B4-BE49-F238E27FC236}">
+                <a16:creationId xmlns:a16="http://schemas.microsoft.com/office/drawing/2014/main" id="{8169AE2F-409B-BC91-0D1E-5BF47F817C45}"/>
+              </a:ext>
+            </a:extLst>
+          </p:cNvPr>
+          <p:cNvSpPr/>
+          <p:nvPr/>
+        </p:nvSpPr>
+        <p:spPr>
+          <a:xfrm>
+            <a:off x="16926561" y="18856979"/>
+            <a:ext cx="1478280" cy="106680"/>
+          </a:xfrm>
+          <a:prstGeom prst="rect">
+            <a:avLst/>
+          </a:prstGeom>
+          <a:solidFill>
+            <a:srgbClr val="000000"/>
+          </a:solidFill>
+          <a:ln>
+            <a:noFill/>
+          </a:ln>
+        </p:spPr>
+        <p:style>
+          <a:lnRef idx="2">
+            <a:schemeClr val="accent1">
+              <a:shade val="50000"/>
+            </a:schemeClr>
+          </a:lnRef>
+          <a:fillRef idx="1">
+            <a:schemeClr val="accent1"/>
+          </a:fillRef>
+          <a:effectRef idx="0">
+            <a:schemeClr val="accent1"/>
+          </a:effectRef>
+          <a:fontRef idx="minor">
+            <a:schemeClr val="lt1"/>
+          </a:fontRef>
+        </p:style>
+        <p:txBody>
+          <a:bodyPr rtlCol="0" anchor="ctr"/>
+          <a:lstStyle/>
+          <a:p>
+            <a:pPr algn="ctr"/>
+            <a:endParaRPr lang="en-US"/>
+          </a:p>
+        </p:txBody>
+      </p:sp>
+      <p:sp>
+        <p:nvSpPr>
+          <p:cNvPr id="52" name="Rectangle 51">
+            <a:extLst>
+              <a:ext uri="{FF2B5EF4-FFF2-40B4-BE49-F238E27FC236}">
+                <a16:creationId xmlns:a16="http://schemas.microsoft.com/office/drawing/2014/main" id="{36826618-CC75-CCA1-8B65-BEBF0927F736}"/>
+              </a:ext>
+            </a:extLst>
+          </p:cNvPr>
+          <p:cNvSpPr/>
+          <p:nvPr/>
+        </p:nvSpPr>
+        <p:spPr>
+          <a:xfrm>
+            <a:off x="16926561" y="20106659"/>
+            <a:ext cx="1478280" cy="106680"/>
+          </a:xfrm>
+          <a:prstGeom prst="rect">
+            <a:avLst/>
+          </a:prstGeom>
+          <a:solidFill>
+            <a:srgbClr val="0002FC"/>
+          </a:solidFill>
+          <a:ln>
+            <a:noFill/>
+          </a:ln>
+        </p:spPr>
+        <p:style>
+          <a:lnRef idx="2">
+            <a:schemeClr val="accent1">
+              <a:shade val="50000"/>
+            </a:schemeClr>
+          </a:lnRef>
+          <a:fillRef idx="1">
+            <a:schemeClr val="accent1"/>
+          </a:fillRef>
+          <a:effectRef idx="0">
+            <a:schemeClr val="accent1"/>
+          </a:effectRef>
+          <a:fontRef idx="minor">
+            <a:schemeClr val="lt1"/>
+          </a:fontRef>
+        </p:style>
+        <p:txBody>
+          <a:bodyPr rtlCol="0" anchor="ctr"/>
+          <a:lstStyle/>
+          <a:p>
+            <a:pPr algn="ctr"/>
+            <a:endParaRPr lang="en-US"/>
+          </a:p>
+        </p:txBody>
+      </p:sp>
+      <p:sp>
+        <p:nvSpPr>
+          <p:cNvPr id="53" name="Rectangle 52">
+            <a:extLst>
+              <a:ext uri="{FF2B5EF4-FFF2-40B4-BE49-F238E27FC236}">
+                <a16:creationId xmlns:a16="http://schemas.microsoft.com/office/drawing/2014/main" id="{979962F8-CEDA-84CA-AEFE-19EEBA477C5B}"/>
+              </a:ext>
+            </a:extLst>
+          </p:cNvPr>
+          <p:cNvSpPr/>
+          <p:nvPr/>
+        </p:nvSpPr>
+        <p:spPr>
+          <a:xfrm>
+            <a:off x="16926561" y="21356339"/>
+            <a:ext cx="1478280" cy="106680"/>
+          </a:xfrm>
+          <a:prstGeom prst="rect">
+            <a:avLst/>
+          </a:prstGeom>
+          <a:solidFill>
+            <a:srgbClr val="00FF01"/>
+          </a:solidFill>
+          <a:ln>
+            <a:noFill/>
+          </a:ln>
+        </p:spPr>
+        <p:style>
+          <a:lnRef idx="2">
+            <a:schemeClr val="accent1">
+              <a:shade val="50000"/>
+            </a:schemeClr>
+          </a:lnRef>
+          <a:fillRef idx="1">
+            <a:schemeClr val="accent1"/>
+          </a:fillRef>
+          <a:effectRef idx="0">
+            <a:schemeClr val="accent1"/>
+          </a:effectRef>
+          <a:fontRef idx="minor">
+            <a:schemeClr val="lt1"/>
+          </a:fontRef>
+        </p:style>
+        <p:txBody>
+          <a:bodyPr rtlCol="0" anchor="ctr"/>
+          <a:lstStyle/>
+          <a:p>
+            <a:pPr algn="ctr"/>
+            <a:endParaRPr lang="en-US"/>
+          </a:p>
+        </p:txBody>
+      </p:sp>
+      <p:sp>
+        <p:nvSpPr>
+          <p:cNvPr id="54" name="TextBox 53">
+            <a:extLst>
+              <a:ext uri="{FF2B5EF4-FFF2-40B4-BE49-F238E27FC236}">
+                <a16:creationId xmlns:a16="http://schemas.microsoft.com/office/drawing/2014/main" id="{DCC2A0B6-2397-1516-82EF-6531A122F759}"/>
+              </a:ext>
+            </a:extLst>
+          </p:cNvPr>
+          <p:cNvSpPr txBox="1"/>
+          <p:nvPr/>
+        </p:nvSpPr>
+        <p:spPr>
+          <a:xfrm>
+            <a:off x="18739756" y="18544608"/>
+            <a:ext cx="5867312" cy="707886"/>
+          </a:xfrm>
+          <a:prstGeom prst="rect">
+            <a:avLst/>
+          </a:prstGeom>
+          <a:noFill/>
+        </p:spPr>
+        <p:txBody>
+          <a:bodyPr wrap="none" rtlCol="0">
+            <a:spAutoFit/>
+          </a:bodyPr>
+          <a:lstStyle/>
+          <a:p>
+            <a:r>
+              <a:rPr lang="en-US" sz="4000" dirty="0">
+                <a:latin typeface="Arial" panose="020B0604020202020204" pitchFamily="34" charset="0"/>
+                <a:cs typeface="Arial" panose="020B0604020202020204" pitchFamily="34" charset="0"/>
+              </a:rPr>
+              <a:t>DO = 7.7 mg L</a:t>
+            </a:r>
+            <a:r>
+              <a:rPr lang="en-US" sz="4000" baseline="30000" dirty="0">
+                <a:latin typeface="Arial" panose="020B0604020202020204" pitchFamily="34" charset="0"/>
+                <a:cs typeface="Arial" panose="020B0604020202020204" pitchFamily="34" charset="0"/>
+              </a:rPr>
+              <a:t>-1</a:t>
+            </a:r>
+            <a:r>
+              <a:rPr lang="en-US" sz="4000" dirty="0">
+                <a:latin typeface="Arial" panose="020B0604020202020204" pitchFamily="34" charset="0"/>
+                <a:cs typeface="Arial" panose="020B0604020202020204" pitchFamily="34" charset="0"/>
+              </a:rPr>
+              <a:t> (control)</a:t>
+            </a:r>
+          </a:p>
+        </p:txBody>
+      </p:sp>
+      <p:sp>
+        <p:nvSpPr>
+          <p:cNvPr id="55" name="TextBox 54">
+            <a:extLst>
+              <a:ext uri="{FF2B5EF4-FFF2-40B4-BE49-F238E27FC236}">
+                <a16:creationId xmlns:a16="http://schemas.microsoft.com/office/drawing/2014/main" id="{C63074A4-8786-A262-2386-DEDFAB70329F}"/>
+              </a:ext>
+            </a:extLst>
+          </p:cNvPr>
+          <p:cNvSpPr txBox="1"/>
+          <p:nvPr/>
+        </p:nvSpPr>
+        <p:spPr>
+          <a:xfrm>
+            <a:off x="18739760" y="19788884"/>
+            <a:ext cx="3841116" cy="707886"/>
+          </a:xfrm>
+          <a:prstGeom prst="rect">
+            <a:avLst/>
+          </a:prstGeom>
+          <a:noFill/>
+        </p:spPr>
+        <p:txBody>
+          <a:bodyPr wrap="none" rtlCol="0">
+            <a:spAutoFit/>
+          </a:bodyPr>
+          <a:lstStyle/>
+          <a:p>
+            <a:r>
+              <a:rPr lang="en-US" sz="4000" dirty="0">
+                <a:latin typeface="Arial" panose="020B0604020202020204" pitchFamily="34" charset="0"/>
+                <a:cs typeface="Arial" panose="020B0604020202020204" pitchFamily="34" charset="0"/>
+              </a:rPr>
+              <a:t>DO = 4.2 mg L</a:t>
+            </a:r>
+            <a:r>
+              <a:rPr lang="en-US" sz="4000" baseline="30000" dirty="0">
+                <a:latin typeface="Arial" panose="020B0604020202020204" pitchFamily="34" charset="0"/>
+                <a:cs typeface="Arial" panose="020B0604020202020204" pitchFamily="34" charset="0"/>
+              </a:rPr>
+              <a:t>-1</a:t>
+            </a:r>
+            <a:endParaRPr lang="en-US" sz="4000" dirty="0">
+              <a:latin typeface="Arial" panose="020B0604020202020204" pitchFamily="34" charset="0"/>
+              <a:cs typeface="Arial" panose="020B0604020202020204" pitchFamily="34" charset="0"/>
+            </a:endParaRPr>
+          </a:p>
+        </p:txBody>
+      </p:sp>
+      <p:sp>
+        <p:nvSpPr>
+          <p:cNvPr id="56" name="TextBox 55">
+            <a:extLst>
+              <a:ext uri="{FF2B5EF4-FFF2-40B4-BE49-F238E27FC236}">
+                <a16:creationId xmlns:a16="http://schemas.microsoft.com/office/drawing/2014/main" id="{ED379064-26C2-BBBE-C54D-E1DB38ABC098}"/>
+              </a:ext>
+            </a:extLst>
+          </p:cNvPr>
+          <p:cNvSpPr txBox="1"/>
+          <p:nvPr/>
+        </p:nvSpPr>
+        <p:spPr>
+          <a:xfrm>
+            <a:off x="18739760" y="21035769"/>
+            <a:ext cx="3841116" cy="707886"/>
+          </a:xfrm>
+          <a:prstGeom prst="rect">
+            <a:avLst/>
+          </a:prstGeom>
+          <a:noFill/>
+        </p:spPr>
+        <p:txBody>
+          <a:bodyPr wrap="none" rtlCol="0">
+            <a:spAutoFit/>
+          </a:bodyPr>
+          <a:lstStyle/>
+          <a:p>
+            <a:r>
+              <a:rPr lang="en-US" sz="4000" dirty="0">
+                <a:latin typeface="Arial" panose="020B0604020202020204" pitchFamily="34" charset="0"/>
+                <a:cs typeface="Arial" panose="020B0604020202020204" pitchFamily="34" charset="0"/>
+              </a:rPr>
+              <a:t>DO = 3.1 mg L</a:t>
+            </a:r>
+            <a:r>
+              <a:rPr lang="en-US" sz="4000" baseline="30000" dirty="0">
+                <a:latin typeface="Arial" panose="020B0604020202020204" pitchFamily="34" charset="0"/>
+                <a:cs typeface="Arial" panose="020B0604020202020204" pitchFamily="34" charset="0"/>
+              </a:rPr>
+              <a:t>-1</a:t>
+            </a:r>
+            <a:endParaRPr lang="en-US" sz="4000" dirty="0">
+              <a:latin typeface="Arial" panose="020B0604020202020204" pitchFamily="34" charset="0"/>
+              <a:cs typeface="Arial" panose="020B0604020202020204" pitchFamily="34" charset="0"/>
+            </a:endParaRPr>
+          </a:p>
+        </p:txBody>
+      </p:sp>
+      <p:sp>
+        <p:nvSpPr>
+          <p:cNvPr id="8" name="Rectangle 7">
+            <a:extLst>
+              <a:ext uri="{FF2B5EF4-FFF2-40B4-BE49-F238E27FC236}">
+                <a16:creationId xmlns:a16="http://schemas.microsoft.com/office/drawing/2014/main" id="{4507A610-2B4F-8BA6-9121-E0FAD2CC31C5}"/>
+              </a:ext>
+            </a:extLst>
+          </p:cNvPr>
+          <p:cNvSpPr/>
+          <p:nvPr/>
+        </p:nvSpPr>
+        <p:spPr>
+          <a:xfrm>
+            <a:off x="16926561" y="22606021"/>
+            <a:ext cx="1478280" cy="106680"/>
+          </a:xfrm>
+          <a:prstGeom prst="rect">
+            <a:avLst/>
+          </a:prstGeom>
+          <a:solidFill>
+            <a:srgbClr val="FE0101"/>
+          </a:solidFill>
+          <a:ln>
+            <a:noFill/>
+          </a:ln>
+        </p:spPr>
+        <p:style>
+          <a:lnRef idx="2">
+            <a:schemeClr val="accent1">
+              <a:shade val="50000"/>
+            </a:schemeClr>
+          </a:lnRef>
+          <a:fillRef idx="1">
+            <a:schemeClr val="accent1"/>
+          </a:fillRef>
+          <a:effectRef idx="0">
+            <a:schemeClr val="accent1"/>
+          </a:effectRef>
+          <a:fontRef idx="minor">
+            <a:schemeClr val="lt1"/>
+          </a:fontRef>
+        </p:style>
+        <p:txBody>
+          <a:bodyPr rtlCol="0" anchor="ctr"/>
+          <a:lstStyle/>
+          <a:p>
+            <a:pPr algn="ctr"/>
+            <a:endParaRPr lang="en-US"/>
+          </a:p>
+        </p:txBody>
+      </p:sp>
+      <p:sp>
+        <p:nvSpPr>
+          <p:cNvPr id="9" name="TextBox 8">
+            <a:extLst>
+              <a:ext uri="{FF2B5EF4-FFF2-40B4-BE49-F238E27FC236}">
+                <a16:creationId xmlns:a16="http://schemas.microsoft.com/office/drawing/2014/main" id="{7C675FA7-390A-33A4-0685-DDC3C0D842C2}"/>
+              </a:ext>
+            </a:extLst>
+          </p:cNvPr>
+          <p:cNvSpPr txBox="1"/>
+          <p:nvPr/>
+        </p:nvSpPr>
+        <p:spPr>
+          <a:xfrm>
+            <a:off x="18736802" y="22283688"/>
+            <a:ext cx="3841116" cy="707886"/>
+          </a:xfrm>
+          <a:prstGeom prst="rect">
+            <a:avLst/>
+          </a:prstGeom>
+          <a:noFill/>
+        </p:spPr>
+        <p:txBody>
+          <a:bodyPr wrap="none" rtlCol="0">
+            <a:spAutoFit/>
+          </a:bodyPr>
+          <a:lstStyle/>
+          <a:p>
+            <a:r>
+              <a:rPr lang="en-US" sz="4000" dirty="0">
+                <a:latin typeface="Arial" panose="020B0604020202020204" pitchFamily="34" charset="0"/>
+                <a:cs typeface="Arial" panose="020B0604020202020204" pitchFamily="34" charset="0"/>
+              </a:rPr>
+              <a:t>DO = 2.7 mg L</a:t>
+            </a:r>
+            <a:r>
+              <a:rPr lang="en-US" sz="4000" baseline="30000" dirty="0">
+                <a:latin typeface="Arial" panose="020B0604020202020204" pitchFamily="34" charset="0"/>
+                <a:cs typeface="Arial" panose="020B0604020202020204" pitchFamily="34" charset="0"/>
+              </a:rPr>
+              <a:t>-1</a:t>
+            </a:r>
+            <a:endParaRPr lang="en-US" sz="4000" dirty="0">
+              <a:latin typeface="Arial" panose="020B0604020202020204" pitchFamily="34" charset="0"/>
+              <a:cs typeface="Arial" panose="020B0604020202020204" pitchFamily="34" charset="0"/>
+            </a:endParaRPr>
+          </a:p>
+        </p:txBody>
+      </p:sp>
+    </p:spTree>
+    <p:extLst>
+      <p:ext uri="{BB962C8B-B14F-4D97-AF65-F5344CB8AC3E}">
+        <p14:creationId xmlns:p14="http://schemas.microsoft.com/office/powerpoint/2010/main" val="3818127175"/>
+      </p:ext>
+    </p:extLst>
+  </p:cSld>
+  <p:clrMapOvr>
+    <a:masterClrMapping/>
+  </p:clrMapOvr>
+</p:sld>
+</file>
+
 <file path=ppt/theme/theme1.xml><?xml version="1.0" encoding="utf-8"?>
 <a:theme xmlns:a="http://schemas.openxmlformats.org/drawingml/2006/main" name="Office Theme">
   <a:themeElements>

</xml_diff>